<commit_message>
Added updated file (#3)
</commit_message>
<xml_diff>
--- a/Rendering in browser.pptx
+++ b/Rendering in browser.pptx
@@ -122,6 +122,11 @@
       </a:defRPr>
     </a:lvl9pPr>
   </p:defaultTextStyle>
+  <p:extLst>
+    <p:ext uri="{EFAFB233-063F-42B5-8137-9DF3F51BA10A}">
+      <p15:sldGuideLst xmlns:p15="http://schemas.microsoft.com/office/powerpoint/2012/main"/>
+    </p:ext>
+  </p:extLst>
 </p:presentation>
 </file>
 
@@ -460,7 +465,7 @@
           <a:p>
             <a:fld id="{26DC4C57-5512-4A84-B540-4800BEE7CD6F}" type="datetimeFigureOut">
               <a:rPr lang="en-IN" smtClean="0"/>
-              <a:t>01-10-2019</a:t>
+              <a:t>09-10-2019</a:t>
             </a:fld>
             <a:endParaRPr lang="en-IN"/>
           </a:p>
@@ -1548,7 +1553,7 @@
           <a:p>
             <a:fld id="{26DC4C57-5512-4A84-B540-4800BEE7CD6F}" type="datetimeFigureOut">
               <a:rPr lang="en-IN" smtClean="0"/>
-              <a:t>01-10-2019</a:t>
+              <a:t>09-10-2019</a:t>
             </a:fld>
             <a:endParaRPr lang="en-IN"/>
           </a:p>
@@ -2528,7 +2533,7 @@
           <a:p>
             <a:fld id="{26DC4C57-5512-4A84-B540-4800BEE7CD6F}" type="datetimeFigureOut">
               <a:rPr lang="en-IN" smtClean="0"/>
-              <a:t>01-10-2019</a:t>
+              <a:t>09-10-2019</a:t>
             </a:fld>
             <a:endParaRPr lang="en-IN"/>
           </a:p>
@@ -3662,7 +3667,7 @@
           <a:p>
             <a:fld id="{26DC4C57-5512-4A84-B540-4800BEE7CD6F}" type="datetimeFigureOut">
               <a:rPr lang="en-IN" smtClean="0"/>
-              <a:t>01-10-2019</a:t>
+              <a:t>09-10-2019</a:t>
             </a:fld>
             <a:endParaRPr lang="en-IN"/>
           </a:p>
@@ -4695,7 +4700,7 @@
           <a:p>
             <a:fld id="{26DC4C57-5512-4A84-B540-4800BEE7CD6F}" type="datetimeFigureOut">
               <a:rPr lang="en-IN" smtClean="0"/>
-              <a:t>01-10-2019</a:t>
+              <a:t>09-10-2019</a:t>
             </a:fld>
             <a:endParaRPr lang="en-IN"/>
           </a:p>
@@ -5355,7 +5360,7 @@
           <a:p>
             <a:fld id="{26DC4C57-5512-4A84-B540-4800BEE7CD6F}" type="datetimeFigureOut">
               <a:rPr lang="en-IN" smtClean="0"/>
-              <a:t>01-10-2019</a:t>
+              <a:t>09-10-2019</a:t>
             </a:fld>
             <a:endParaRPr lang="en-IN"/>
           </a:p>
@@ -6216,7 +6221,7 @@
           <a:p>
             <a:fld id="{26DC4C57-5512-4A84-B540-4800BEE7CD6F}" type="datetimeFigureOut">
               <a:rPr lang="en-IN" smtClean="0"/>
-              <a:t>01-10-2019</a:t>
+              <a:t>09-10-2019</a:t>
             </a:fld>
             <a:endParaRPr lang="en-IN"/>
           </a:p>
@@ -6406,7 +6411,7 @@
           <a:p>
             <a:fld id="{26DC4C57-5512-4A84-B540-4800BEE7CD6F}" type="datetimeFigureOut">
               <a:rPr lang="en-IN" smtClean="0"/>
-              <a:t>01-10-2019</a:t>
+              <a:t>09-10-2019</a:t>
             </a:fld>
             <a:endParaRPr lang="en-IN"/>
           </a:p>
@@ -7378,7 +7383,7 @@
           <a:p>
             <a:fld id="{26DC4C57-5512-4A84-B540-4800BEE7CD6F}" type="datetimeFigureOut">
               <a:rPr lang="en-IN" smtClean="0"/>
-              <a:t>01-10-2019</a:t>
+              <a:t>09-10-2019</a:t>
             </a:fld>
             <a:endParaRPr lang="en-IN"/>
           </a:p>
@@ -7589,7 +7594,7 @@
           <a:p>
             <a:fld id="{26DC4C57-5512-4A84-B540-4800BEE7CD6F}" type="datetimeFigureOut">
               <a:rPr lang="en-IN" smtClean="0"/>
-              <a:t>01-10-2019</a:t>
+              <a:t>09-10-2019</a:t>
             </a:fld>
             <a:endParaRPr lang="en-IN"/>
           </a:p>
@@ -8623,7 +8628,7 @@
           <a:p>
             <a:fld id="{26DC4C57-5512-4A84-B540-4800BEE7CD6F}" type="datetimeFigureOut">
               <a:rPr lang="en-IN" smtClean="0"/>
-              <a:t>01-10-2019</a:t>
+              <a:t>09-10-2019</a:t>
             </a:fld>
             <a:endParaRPr lang="en-IN"/>
           </a:p>
@@ -8895,7 +8900,7 @@
           <a:p>
             <a:fld id="{26DC4C57-5512-4A84-B540-4800BEE7CD6F}" type="datetimeFigureOut">
               <a:rPr lang="en-IN" smtClean="0"/>
-              <a:t>01-10-2019</a:t>
+              <a:t>09-10-2019</a:t>
             </a:fld>
             <a:endParaRPr lang="en-IN"/>
           </a:p>
@@ -9305,7 +9310,7 @@
           <a:p>
             <a:fld id="{26DC4C57-5512-4A84-B540-4800BEE7CD6F}" type="datetimeFigureOut">
               <a:rPr lang="en-IN" smtClean="0"/>
-              <a:t>01-10-2019</a:t>
+              <a:t>09-10-2019</a:t>
             </a:fld>
             <a:endParaRPr lang="en-IN"/>
           </a:p>
@@ -9432,7 +9437,7 @@
           <a:p>
             <a:fld id="{26DC4C57-5512-4A84-B540-4800BEE7CD6F}" type="datetimeFigureOut">
               <a:rPr lang="en-IN" smtClean="0"/>
-              <a:t>01-10-2019</a:t>
+              <a:t>09-10-2019</a:t>
             </a:fld>
             <a:endParaRPr lang="en-IN"/>
           </a:p>
@@ -9527,7 +9532,7 @@
           <a:p>
             <a:fld id="{26DC4C57-5512-4A84-B540-4800BEE7CD6F}" type="datetimeFigureOut">
               <a:rPr lang="en-IN" smtClean="0"/>
-              <a:t>01-10-2019</a:t>
+              <a:t>09-10-2019</a:t>
             </a:fld>
             <a:endParaRPr lang="en-IN"/>
           </a:p>
@@ -10608,7 +10613,7 @@
           <a:p>
             <a:fld id="{26DC4C57-5512-4A84-B540-4800BEE7CD6F}" type="datetimeFigureOut">
               <a:rPr lang="en-IN" smtClean="0"/>
-              <a:t>01-10-2019</a:t>
+              <a:t>09-10-2019</a:t>
             </a:fld>
             <a:endParaRPr lang="en-IN"/>
           </a:p>
@@ -11716,7 +11721,7 @@
           <a:p>
             <a:fld id="{26DC4C57-5512-4A84-B540-4800BEE7CD6F}" type="datetimeFigureOut">
               <a:rPr lang="en-IN" smtClean="0"/>
-              <a:t>01-10-2019</a:t>
+              <a:t>09-10-2019</a:t>
             </a:fld>
             <a:endParaRPr lang="en-IN"/>
           </a:p>
@@ -12713,7 +12718,7 @@
           <a:p>
             <a:fld id="{26DC4C57-5512-4A84-B540-4800BEE7CD6F}" type="datetimeFigureOut">
               <a:rPr lang="en-IN" smtClean="0"/>
-              <a:t>01-10-2019</a:t>
+              <a:t>09-10-2019</a:t>
             </a:fld>
             <a:endParaRPr lang="en-IN"/>
           </a:p>
@@ -13456,23 +13461,12 @@
           <a:p>
             <a:r>
               <a:rPr lang="en-IN" dirty="0" smtClean="0"/>
-              <a:t>Bytes = &gt; Characters = &gt; Tokens = &gt; Nodes = &gt;Tree/CSSOM</a:t>
-            </a:r>
-          </a:p>
-          <a:p>
-            <a:pPr marL="0" indent="0">
-              <a:buNone/>
-            </a:pPr>
-            <a:endParaRPr lang="en-IN" dirty="0" smtClean="0"/>
-          </a:p>
-          <a:p>
+              <a:t>Bytes = &gt; Characters = &gt; Tokens = &gt; Nodes = &gt;</a:t>
+            </a:r>
             <a:r>
               <a:rPr lang="en-IN" dirty="0" smtClean="0"/>
-              <a:t>CSS has something called as Cascade. –(Assignment)</a:t>
-            </a:r>
-            <a:endParaRPr lang="en-IN" dirty="0"/>
-          </a:p>
-          <a:p>
+              <a:t>Tree/CSSOM</a:t>
+            </a:r>
             <a:endParaRPr lang="en-IN" dirty="0" smtClean="0"/>
           </a:p>
           <a:p>
@@ -13807,28 +13801,7 @@
             </a:r>
             <a:r>
               <a:rPr lang="en-US" dirty="0" smtClean="0"/>
-              <a:t>.</a:t>
-            </a:r>
-          </a:p>
-          <a:p>
-            <a:r>
-              <a:rPr lang="en-US" dirty="0" smtClean="0"/>
-              <a:t>It’s </a:t>
-            </a:r>
-            <a:r>
-              <a:rPr lang="en-US" dirty="0"/>
-              <a:t>like passing on </a:t>
-            </a:r>
-            <a:r>
-              <a:rPr lang="en-US" dirty="0" err="1" smtClean="0"/>
-              <a:t>th</a:t>
-            </a:r>
-            <a:endParaRPr lang="en-US" dirty="0" smtClean="0"/>
-          </a:p>
-          <a:p>
-            <a:r>
-              <a:rPr lang="en-US" dirty="0" smtClean="0"/>
-              <a:t>e </a:t>
+              <a:t>. e </a:t>
             </a:r>
             <a:r>
               <a:rPr lang="en-US" dirty="0"/>
@@ -14736,12 +14709,12 @@
               <a:t>Popular Browser </a:t>
             </a:r>
             <a:r>
-              <a:rPr lang="en-IN" dirty="0" err="1" smtClean="0"/>
+              <a:rPr lang="en-IN" dirty="0" smtClean="0"/>
               <a:t>engin</a:t>
             </a:r>
             <a:r>
-              <a:rPr lang="en-IN" dirty="0" err="1"/>
-              <a:t>s</a:t>
+              <a:rPr lang="en-IN" dirty="0"/>
+              <a:t>e</a:t>
             </a:r>
             <a:endParaRPr lang="en-IN" dirty="0"/>
           </a:p>
@@ -14774,7 +14747,11 @@
           <a:p>
             <a:r>
               <a:rPr lang="en-IN" dirty="0" smtClean="0"/>
-              <a:t>Chrome’s BE is called V8</a:t>
+              <a:t>Chrome’s BE is called </a:t>
+            </a:r>
+            <a:r>
+              <a:rPr lang="en-IN" dirty="0" smtClean="0"/>
+              <a:t>Blink</a:t>
             </a:r>
             <a:endParaRPr lang="en-IN" dirty="0"/>
           </a:p>

</xml_diff>